<commit_message>
Add link to siftr
</commit_message>
<xml_diff>
--- a/courses/r-intro/docs/Intro to R 2023_day2.pptx
+++ b/courses/r-intro/docs/Intro to R 2023_day2.pptx
@@ -120,6 +120,11 @@
       </a:defRPr>
     </a:lvl9pPr>
   </p:defaultTextStyle>
+  <p:extLst>
+    <p:ext uri="{EFAFB233-063F-42B5-8137-9DF3F51BA10A}">
+      <p15:sldGuideLst xmlns:p15="http://schemas.microsoft.com/office/powerpoint/2012/main"/>
+    </p:ext>
+  </p:extLst>
 </p:presentation>
 </file>
 
@@ -272,7 +277,7 @@
           <a:p>
             <a:fld id="{FBD30073-4D14-4614-B8E3-87038BE78D7F}" type="datetimeFigureOut">
               <a:rPr lang="en-GB" smtClean="0"/>
-              <a:t>18/11/2023</a:t>
+              <a:t>20/11/2023</a:t>
             </a:fld>
             <a:endParaRPr lang="en-GB"/>
           </a:p>
@@ -472,7 +477,7 @@
           <a:p>
             <a:fld id="{FBD30073-4D14-4614-B8E3-87038BE78D7F}" type="datetimeFigureOut">
               <a:rPr lang="en-GB" smtClean="0"/>
-              <a:t>18/11/2023</a:t>
+              <a:t>20/11/2023</a:t>
             </a:fld>
             <a:endParaRPr lang="en-GB"/>
           </a:p>
@@ -682,7 +687,7 @@
           <a:p>
             <a:fld id="{FBD30073-4D14-4614-B8E3-87038BE78D7F}" type="datetimeFigureOut">
               <a:rPr lang="en-GB" smtClean="0"/>
-              <a:t>18/11/2023</a:t>
+              <a:t>20/11/2023</a:t>
             </a:fld>
             <a:endParaRPr lang="en-GB"/>
           </a:p>
@@ -882,7 +887,7 @@
           <a:p>
             <a:fld id="{FBD30073-4D14-4614-B8E3-87038BE78D7F}" type="datetimeFigureOut">
               <a:rPr lang="en-GB" smtClean="0"/>
-              <a:t>18/11/2023</a:t>
+              <a:t>20/11/2023</a:t>
             </a:fld>
             <a:endParaRPr lang="en-GB"/>
           </a:p>
@@ -1158,7 +1163,7 @@
           <a:p>
             <a:fld id="{FBD30073-4D14-4614-B8E3-87038BE78D7F}" type="datetimeFigureOut">
               <a:rPr lang="en-GB" smtClean="0"/>
-              <a:t>18/11/2023</a:t>
+              <a:t>20/11/2023</a:t>
             </a:fld>
             <a:endParaRPr lang="en-GB"/>
           </a:p>
@@ -1426,7 +1431,7 @@
           <a:p>
             <a:fld id="{FBD30073-4D14-4614-B8E3-87038BE78D7F}" type="datetimeFigureOut">
               <a:rPr lang="en-GB" smtClean="0"/>
-              <a:t>18/11/2023</a:t>
+              <a:t>20/11/2023</a:t>
             </a:fld>
             <a:endParaRPr lang="en-GB"/>
           </a:p>
@@ -1841,7 +1846,7 @@
           <a:p>
             <a:fld id="{FBD30073-4D14-4614-B8E3-87038BE78D7F}" type="datetimeFigureOut">
               <a:rPr lang="en-GB" smtClean="0"/>
-              <a:t>18/11/2023</a:t>
+              <a:t>20/11/2023</a:t>
             </a:fld>
             <a:endParaRPr lang="en-GB"/>
           </a:p>
@@ -1983,7 +1988,7 @@
           <a:p>
             <a:fld id="{FBD30073-4D14-4614-B8E3-87038BE78D7F}" type="datetimeFigureOut">
               <a:rPr lang="en-GB" smtClean="0"/>
-              <a:t>18/11/2023</a:t>
+              <a:t>20/11/2023</a:t>
             </a:fld>
             <a:endParaRPr lang="en-GB"/>
           </a:p>
@@ -2096,7 +2101,7 @@
           <a:p>
             <a:fld id="{FBD30073-4D14-4614-B8E3-87038BE78D7F}" type="datetimeFigureOut">
               <a:rPr lang="en-GB" smtClean="0"/>
-              <a:t>18/11/2023</a:t>
+              <a:t>20/11/2023</a:t>
             </a:fld>
             <a:endParaRPr lang="en-GB"/>
           </a:p>
@@ -2409,7 +2414,7 @@
           <a:p>
             <a:fld id="{FBD30073-4D14-4614-B8E3-87038BE78D7F}" type="datetimeFigureOut">
               <a:rPr lang="en-GB" smtClean="0"/>
-              <a:t>18/11/2023</a:t>
+              <a:t>20/11/2023</a:t>
             </a:fld>
             <a:endParaRPr lang="en-GB"/>
           </a:p>
@@ -2698,7 +2703,7 @@
           <a:p>
             <a:fld id="{FBD30073-4D14-4614-B8E3-87038BE78D7F}" type="datetimeFigureOut">
               <a:rPr lang="en-GB" smtClean="0"/>
-              <a:t>18/11/2023</a:t>
+              <a:t>20/11/2023</a:t>
             </a:fld>
             <a:endParaRPr lang="en-GB"/>
           </a:p>
@@ -2941,7 +2946,7 @@
           <a:p>
             <a:fld id="{FBD30073-4D14-4614-B8E3-87038BE78D7F}" type="datetimeFigureOut">
               <a:rPr lang="en-GB" smtClean="0"/>
-              <a:t>18/11/2023</a:t>
+              <a:t>20/11/2023</a:t>
             </a:fld>
             <a:endParaRPr lang="en-GB"/>
           </a:p>
@@ -4550,6 +4555,41 @@
             <a:r>
               <a:rPr lang="en-GB" dirty="0"/>
               <a:t>Skipping headers – useful for NASA Ames</a:t>
+            </a:r>
+            <a:br>
+              <a:rPr lang="en-GB" dirty="0"/>
+            </a:br>
+            <a:br>
+              <a:rPr lang="en-GB" dirty="0"/>
+            </a:br>
+            <a:endParaRPr lang="en-GB" dirty="0"/>
+          </a:p>
+          <a:p>
+            <a:r>
+              <a:rPr lang="en-GB" dirty="0"/>
+              <a:t>More complex plain texts include the </a:t>
+            </a:r>
+            <a:r>
+              <a:rPr lang="en-GB" dirty="0" err="1"/>
+              <a:t>the</a:t>
+            </a:r>
+            <a:r>
+              <a:rPr lang="en-GB" dirty="0"/>
+              <a:t> Sift outputs!</a:t>
+            </a:r>
+          </a:p>
+          <a:p>
+            <a:pPr lvl="1"/>
+            <a:r>
+              <a:rPr lang="en-GB" dirty="0"/>
+              <a:t>Fortunately someone has written code to do this: </a:t>
+            </a:r>
+            <a:br>
+              <a:rPr lang="en-GB" dirty="0"/>
+            </a:br>
+            <a:r>
+              <a:rPr lang="en-GB" dirty="0"/>
+              <a:t>https://github.com/wacl-york/siftr</a:t>
             </a:r>
           </a:p>
         </p:txBody>

</xml_diff>

<commit_message>
Add info on sift R
</commit_message>
<xml_diff>
--- a/courses/r-intro/docs/Intro to R 2023_day2.pptx
+++ b/courses/r-intro/docs/Intro to R 2023_day2.pptx
@@ -4563,6 +4563,42 @@
               <a:rPr lang="en-GB" dirty="0"/>
               <a:t>Skipping headers – useful for NASA Ames</a:t>
             </a:r>
+          </a:p>
+          <a:p>
+            <a:endParaRPr lang="en-GB" dirty="0"/>
+          </a:p>
+          <a:p>
+            <a:r>
+              <a:rPr lang="en-GB" dirty="0"/>
+              <a:t>Other more complex files include the Sift outputs</a:t>
+            </a:r>
+          </a:p>
+          <a:p>
+            <a:pPr lvl="1"/>
+            <a:r>
+              <a:rPr lang="en-GB" dirty="0"/>
+              <a:t>Fortunately there is already a package for this:</a:t>
+            </a:r>
+            <a:br>
+              <a:rPr lang="en-GB" dirty="0"/>
+            </a:br>
+            <a:r>
+              <a:rPr lang="en-GB" dirty="0"/>
+              <a:t>github.com/</a:t>
+            </a:r>
+            <a:r>
+              <a:rPr lang="en-GB" dirty="0" err="1"/>
+              <a:t>wacl-york</a:t>
+            </a:r>
+            <a:r>
+              <a:rPr lang="en-GB" dirty="0"/>
+              <a:t>/</a:t>
+            </a:r>
+            <a:r>
+              <a:rPr lang="en-GB" dirty="0" err="1"/>
+              <a:t>siftr</a:t>
+            </a:r>
+            <a:endParaRPr lang="en-GB" dirty="0"/>
           </a:p>
         </p:txBody>
       </p:sp>

</xml_diff>